<commit_message>
Add code/ and update powerpoint
</commit_message>
<xml_diff>
--- a/homework/hw10/hw10.pptx
+++ b/homework/hw10/hw10.pptx
@@ -5,16 +5,18 @@
     <p:sldMasterId id="2147483648" r:id="rId1"/>
   </p:sldMasterIdLst>
   <p:notesMasterIdLst>
-    <p:notesMasterId r:id="rId9"/>
+    <p:notesMasterId r:id="rId11"/>
   </p:notesMasterIdLst>
   <p:sldIdLst>
     <p:sldId id="256" r:id="rId2"/>
-    <p:sldId id="257" r:id="rId3"/>
-    <p:sldId id="258" r:id="rId4"/>
-    <p:sldId id="259" r:id="rId5"/>
-    <p:sldId id="260" r:id="rId6"/>
-    <p:sldId id="261" r:id="rId7"/>
-    <p:sldId id="262" r:id="rId8"/>
+    <p:sldId id="264" r:id="rId3"/>
+    <p:sldId id="265" r:id="rId4"/>
+    <p:sldId id="257" r:id="rId5"/>
+    <p:sldId id="258" r:id="rId6"/>
+    <p:sldId id="259" r:id="rId7"/>
+    <p:sldId id="260" r:id="rId8"/>
+    <p:sldId id="263" r:id="rId9"/>
+    <p:sldId id="262" r:id="rId10"/>
   </p:sldIdLst>
   <p:sldSz cx="9144000" cy="6858000" type="screen4x3"/>
   <p:notesSz cx="6858000" cy="9144000"/>
@@ -113,6 +115,22 @@
       </a:defRPr>
     </a:lvl9pPr>
   </p:defaultTextStyle>
+  <p:extLst>
+    <p:ext uri="{EFAFB233-063F-42B5-8137-9DF3F51BA10A}">
+      <p15:sldGuideLst xmlns:p15="http://schemas.microsoft.com/office/powerpoint/2012/main" xmlns="">
+        <p15:guide id="1" orient="horz" pos="2160">
+          <p15:clr>
+            <a:srgbClr val="A4A3A4"/>
+          </p15:clr>
+        </p15:guide>
+        <p15:guide id="2" pos="2880">
+          <p15:clr>
+            <a:srgbClr val="A4A3A4"/>
+          </p15:clr>
+        </p15:guide>
+      </p15:sldGuideLst>
+    </p:ext>
+  </p:extLst>
 </p:presentation>
 </file>
 
@@ -198,7 +216,8 @@
           <a:p>
             <a:fld id="{09976AD3-8EEA-43D7-B9BD-6A1FC425CF8E}" type="datetimeFigureOut">
               <a:rPr lang="zh-TW" altLang="en-US" smtClean="0"/>
-              <a:t>2014/5/4</a:t>
+              <a:pPr/>
+              <a:t>2014/5/5</a:t>
             </a:fld>
             <a:endParaRPr lang="zh-TW" altLang="en-US"/>
           </a:p>
@@ -359,6 +378,7 @@
           <a:p>
             <a:fld id="{90452C19-BD87-448C-AFEB-DDD1B28EB2DD}" type="slidenum">
               <a:rPr lang="zh-TW" altLang="en-US" smtClean="0"/>
+              <a:pPr/>
               <a:t>‹#›</a:t>
             </a:fld>
             <a:endParaRPr lang="zh-TW" altLang="en-US"/>
@@ -366,6 +386,11 @@
         </p:txBody>
       </p:sp>
     </p:spTree>
+    <p:extLst>
+      <p:ext uri="{BB962C8B-B14F-4D97-AF65-F5344CB8AC3E}">
+        <p14:creationId xmlns:p14="http://schemas.microsoft.com/office/powerpoint/2010/main" xmlns="" val="3125697898"/>
+      </p:ext>
+    </p:extLst>
   </p:cSld>
   <p:clrMap bg1="lt1" tx1="dk1" bg2="lt2" tx2="dk2" accent1="accent1" accent2="accent2" accent3="accent3" accent4="accent4" accent5="accent5" accent6="accent6" hlink="hlink" folHlink="folHlink"/>
   <p:notesStyle>
@@ -530,6 +555,7 @@
           <a:p>
             <a:fld id="{90452C19-BD87-448C-AFEB-DDD1B28EB2DD}" type="slidenum">
               <a:rPr lang="zh-TW" altLang="en-US" smtClean="0"/>
+              <a:pPr/>
               <a:t>1</a:t>
             </a:fld>
             <a:endParaRPr lang="zh-TW" altLang="en-US"/>
@@ -537,6 +563,11 @@
         </p:txBody>
       </p:sp>
     </p:spTree>
+    <p:extLst>
+      <p:ext uri="{BB962C8B-B14F-4D97-AF65-F5344CB8AC3E}">
+        <p14:creationId xmlns:p14="http://schemas.microsoft.com/office/powerpoint/2010/main" xmlns="" val="2137521691"/>
+      </p:ext>
+    </p:extLst>
   </p:cSld>
   <p:clrMapOvr>
     <a:masterClrMapping/>
@@ -611,6 +642,7 @@
           <a:p>
             <a:fld id="{90452C19-BD87-448C-AFEB-DDD1B28EB2DD}" type="slidenum">
               <a:rPr lang="zh-TW" altLang="en-US" smtClean="0"/>
+              <a:pPr/>
               <a:t>2</a:t>
             </a:fld>
             <a:endParaRPr lang="zh-TW" altLang="en-US"/>
@@ -618,6 +650,11 @@
         </p:txBody>
       </p:sp>
     </p:spTree>
+    <p:extLst>
+      <p:ext uri="{BB962C8B-B14F-4D97-AF65-F5344CB8AC3E}">
+        <p14:creationId xmlns:p14="http://schemas.microsoft.com/office/powerpoint/2010/main" xmlns="" val="3795125311"/>
+      </p:ext>
+    </p:extLst>
   </p:cSld>
   <p:clrMapOvr>
     <a:masterClrMapping/>
@@ -692,6 +729,7 @@
           <a:p>
             <a:fld id="{90452C19-BD87-448C-AFEB-DDD1B28EB2DD}" type="slidenum">
               <a:rPr lang="zh-TW" altLang="en-US" smtClean="0"/>
+              <a:pPr/>
               <a:t>3</a:t>
             </a:fld>
             <a:endParaRPr lang="zh-TW" altLang="en-US"/>
@@ -699,6 +737,11 @@
         </p:txBody>
       </p:sp>
     </p:spTree>
+    <p:extLst>
+      <p:ext uri="{BB962C8B-B14F-4D97-AF65-F5344CB8AC3E}">
+        <p14:creationId xmlns:p14="http://schemas.microsoft.com/office/powerpoint/2010/main" xmlns="" val="3795125311"/>
+      </p:ext>
+    </p:extLst>
   </p:cSld>
   <p:clrMapOvr>
     <a:masterClrMapping/>
@@ -773,6 +816,7 @@
           <a:p>
             <a:fld id="{90452C19-BD87-448C-AFEB-DDD1B28EB2DD}" type="slidenum">
               <a:rPr lang="zh-TW" altLang="en-US" smtClean="0"/>
+              <a:pPr/>
               <a:t>4</a:t>
             </a:fld>
             <a:endParaRPr lang="zh-TW" altLang="en-US"/>
@@ -780,6 +824,11 @@
         </p:txBody>
       </p:sp>
     </p:spTree>
+    <p:extLst>
+      <p:ext uri="{BB962C8B-B14F-4D97-AF65-F5344CB8AC3E}">
+        <p14:creationId xmlns:p14="http://schemas.microsoft.com/office/powerpoint/2010/main" xmlns="" val="4127167773"/>
+      </p:ext>
+    </p:extLst>
   </p:cSld>
   <p:clrMapOvr>
     <a:masterClrMapping/>
@@ -854,6 +903,7 @@
           <a:p>
             <a:fld id="{90452C19-BD87-448C-AFEB-DDD1B28EB2DD}" type="slidenum">
               <a:rPr lang="zh-TW" altLang="en-US" smtClean="0"/>
+              <a:pPr/>
               <a:t>5</a:t>
             </a:fld>
             <a:endParaRPr lang="zh-TW" altLang="en-US"/>
@@ -861,6 +911,11 @@
         </p:txBody>
       </p:sp>
     </p:spTree>
+    <p:extLst>
+      <p:ext uri="{BB962C8B-B14F-4D97-AF65-F5344CB8AC3E}">
+        <p14:creationId xmlns:p14="http://schemas.microsoft.com/office/powerpoint/2010/main" xmlns="" val="772879501"/>
+      </p:ext>
+    </p:extLst>
   </p:cSld>
   <p:clrMapOvr>
     <a:masterClrMapping/>
@@ -935,6 +990,7 @@
           <a:p>
             <a:fld id="{90452C19-BD87-448C-AFEB-DDD1B28EB2DD}" type="slidenum">
               <a:rPr lang="zh-TW" altLang="en-US" smtClean="0"/>
+              <a:pPr/>
               <a:t>6</a:t>
             </a:fld>
             <a:endParaRPr lang="zh-TW" altLang="en-US"/>
@@ -942,6 +998,11 @@
         </p:txBody>
       </p:sp>
     </p:spTree>
+    <p:extLst>
+      <p:ext uri="{BB962C8B-B14F-4D97-AF65-F5344CB8AC3E}">
+        <p14:creationId xmlns:p14="http://schemas.microsoft.com/office/powerpoint/2010/main" xmlns="" val="3734969176"/>
+      </p:ext>
+    </p:extLst>
   </p:cSld>
   <p:clrMapOvr>
     <a:masterClrMapping/>
@@ -1016,6 +1077,7 @@
           <a:p>
             <a:fld id="{90452C19-BD87-448C-AFEB-DDD1B28EB2DD}" type="slidenum">
               <a:rPr lang="zh-TW" altLang="en-US" smtClean="0"/>
+              <a:pPr/>
               <a:t>7</a:t>
             </a:fld>
             <a:endParaRPr lang="zh-TW" altLang="en-US"/>
@@ -1023,6 +1085,180 @@
         </p:txBody>
       </p:sp>
     </p:spTree>
+    <p:extLst>
+      <p:ext uri="{BB962C8B-B14F-4D97-AF65-F5344CB8AC3E}">
+        <p14:creationId xmlns:p14="http://schemas.microsoft.com/office/powerpoint/2010/main" xmlns="" val="3349036620"/>
+      </p:ext>
+    </p:extLst>
+  </p:cSld>
+  <p:clrMapOvr>
+    <a:masterClrMapping/>
+  </p:clrMapOvr>
+</p:notes>
+</file>
+
+<file path=ppt/notesSlides/notesSlide8.xml><?xml version="1.0" encoding="utf-8"?>
+<p:notes xmlns:a="http://schemas.openxmlformats.org/drawingml/2006/main" xmlns:r="http://schemas.openxmlformats.org/officeDocument/2006/relationships" xmlns:p="http://schemas.openxmlformats.org/presentationml/2006/main">
+  <p:cSld>
+    <p:spTree>
+      <p:nvGrpSpPr>
+        <p:cNvPr id="1" name=""/>
+        <p:cNvGrpSpPr/>
+        <p:nvPr/>
+      </p:nvGrpSpPr>
+      <p:grpSpPr>
+        <a:xfrm>
+          <a:off x="0" y="0"/>
+          <a:ext cx="0" cy="0"/>
+          <a:chOff x="0" y="0"/>
+          <a:chExt cx="0" cy="0"/>
+        </a:xfrm>
+      </p:grpSpPr>
+      <p:sp>
+        <p:nvSpPr>
+          <p:cNvPr id="2" name="投影片圖像版面配置區 1"/>
+          <p:cNvSpPr>
+            <a:spLocks noGrp="1" noRot="1" noChangeAspect="1"/>
+          </p:cNvSpPr>
+          <p:nvPr>
+            <p:ph type="sldImg"/>
+          </p:nvPr>
+        </p:nvSpPr>
+        <p:spPr/>
+      </p:sp>
+      <p:sp>
+        <p:nvSpPr>
+          <p:cNvPr id="3" name="備忘稿版面配置區 2"/>
+          <p:cNvSpPr>
+            <a:spLocks noGrp="1"/>
+          </p:cNvSpPr>
+          <p:nvPr>
+            <p:ph type="body" idx="1"/>
+          </p:nvPr>
+        </p:nvSpPr>
+        <p:spPr/>
+        <p:txBody>
+          <a:bodyPr>
+            <a:normAutofit/>
+          </a:bodyPr>
+          <a:lstStyle/>
+          <a:p>
+            <a:endParaRPr lang="zh-TW" altLang="en-US"/>
+          </a:p>
+        </p:txBody>
+      </p:sp>
+      <p:sp>
+        <p:nvSpPr>
+          <p:cNvPr id="4" name="投影片編號版面配置區 3"/>
+          <p:cNvSpPr>
+            <a:spLocks noGrp="1"/>
+          </p:cNvSpPr>
+          <p:nvPr>
+            <p:ph type="sldNum" sz="quarter" idx="10"/>
+          </p:nvPr>
+        </p:nvSpPr>
+        <p:spPr/>
+        <p:txBody>
+          <a:bodyPr/>
+          <a:lstStyle/>
+          <a:p>
+            <a:fld id="{90452C19-BD87-448C-AFEB-DDD1B28EB2DD}" type="slidenum">
+              <a:rPr lang="zh-TW" altLang="en-US" smtClean="0"/>
+              <a:pPr/>
+              <a:t>8</a:t>
+            </a:fld>
+            <a:endParaRPr lang="zh-TW" altLang="en-US"/>
+          </a:p>
+        </p:txBody>
+      </p:sp>
+    </p:spTree>
+  </p:cSld>
+  <p:clrMapOvr>
+    <a:masterClrMapping/>
+  </p:clrMapOvr>
+</p:notes>
+</file>
+
+<file path=ppt/notesSlides/notesSlide9.xml><?xml version="1.0" encoding="utf-8"?>
+<p:notes xmlns:a="http://schemas.openxmlformats.org/drawingml/2006/main" xmlns:r="http://schemas.openxmlformats.org/officeDocument/2006/relationships" xmlns:p="http://schemas.openxmlformats.org/presentationml/2006/main">
+  <p:cSld>
+    <p:spTree>
+      <p:nvGrpSpPr>
+        <p:cNvPr id="1" name=""/>
+        <p:cNvGrpSpPr/>
+        <p:nvPr/>
+      </p:nvGrpSpPr>
+      <p:grpSpPr>
+        <a:xfrm>
+          <a:off x="0" y="0"/>
+          <a:ext cx="0" cy="0"/>
+          <a:chOff x="0" y="0"/>
+          <a:chExt cx="0" cy="0"/>
+        </a:xfrm>
+      </p:grpSpPr>
+      <p:sp>
+        <p:nvSpPr>
+          <p:cNvPr id="2" name="投影片圖像版面配置區 1"/>
+          <p:cNvSpPr>
+            <a:spLocks noGrp="1" noRot="1" noChangeAspect="1"/>
+          </p:cNvSpPr>
+          <p:nvPr>
+            <p:ph type="sldImg"/>
+          </p:nvPr>
+        </p:nvSpPr>
+        <p:spPr/>
+      </p:sp>
+      <p:sp>
+        <p:nvSpPr>
+          <p:cNvPr id="3" name="備忘稿版面配置區 2"/>
+          <p:cNvSpPr>
+            <a:spLocks noGrp="1"/>
+          </p:cNvSpPr>
+          <p:nvPr>
+            <p:ph type="body" idx="1"/>
+          </p:nvPr>
+        </p:nvSpPr>
+        <p:spPr/>
+        <p:txBody>
+          <a:bodyPr>
+            <a:normAutofit/>
+          </a:bodyPr>
+          <a:lstStyle/>
+          <a:p>
+            <a:endParaRPr lang="zh-TW" altLang="en-US"/>
+          </a:p>
+        </p:txBody>
+      </p:sp>
+      <p:sp>
+        <p:nvSpPr>
+          <p:cNvPr id="4" name="投影片編號版面配置區 3"/>
+          <p:cNvSpPr>
+            <a:spLocks noGrp="1"/>
+          </p:cNvSpPr>
+          <p:nvPr>
+            <p:ph type="sldNum" sz="quarter" idx="10"/>
+          </p:nvPr>
+        </p:nvSpPr>
+        <p:spPr/>
+        <p:txBody>
+          <a:bodyPr/>
+          <a:lstStyle/>
+          <a:p>
+            <a:fld id="{90452C19-BD87-448C-AFEB-DDD1B28EB2DD}" type="slidenum">
+              <a:rPr lang="zh-TW" altLang="en-US" smtClean="0"/>
+              <a:pPr/>
+              <a:t>9</a:t>
+            </a:fld>
+            <a:endParaRPr lang="zh-TW" altLang="en-US"/>
+          </a:p>
+        </p:txBody>
+      </p:sp>
+    </p:spTree>
+    <p:extLst>
+      <p:ext uri="{BB962C8B-B14F-4D97-AF65-F5344CB8AC3E}">
+        <p14:creationId xmlns:p14="http://schemas.microsoft.com/office/powerpoint/2010/main" xmlns="" val="149795866"/>
+      </p:ext>
+    </p:extLst>
   </p:cSld>
   <p:clrMapOvr>
     <a:masterClrMapping/>
@@ -1211,7 +1447,8 @@
           <a:p>
             <a:fld id="{0F0447E4-8838-4AEF-B48D-61B1770176D1}" type="datetimeFigureOut">
               <a:rPr lang="zh-TW" altLang="en-US" smtClean="0"/>
-              <a:t>2014/5/4</a:t>
+              <a:pPr/>
+              <a:t>2014/5/5</a:t>
             </a:fld>
             <a:endParaRPr lang="zh-TW" altLang="en-US"/>
           </a:p>
@@ -1253,6 +1490,7 @@
           <a:p>
             <a:fld id="{239A1177-FC11-4181-8D90-74B5066E7BA4}" type="slidenum">
               <a:rPr lang="zh-TW" altLang="en-US" smtClean="0"/>
+              <a:pPr/>
               <a:t>‹#›</a:t>
             </a:fld>
             <a:endParaRPr lang="zh-TW" altLang="en-US"/>
@@ -1376,7 +1614,8 @@
           <a:p>
             <a:fld id="{0F0447E4-8838-4AEF-B48D-61B1770176D1}" type="datetimeFigureOut">
               <a:rPr lang="zh-TW" altLang="en-US" smtClean="0"/>
-              <a:t>2014/5/4</a:t>
+              <a:pPr/>
+              <a:t>2014/5/5</a:t>
             </a:fld>
             <a:endParaRPr lang="zh-TW" altLang="en-US"/>
           </a:p>
@@ -1418,6 +1657,7 @@
           <a:p>
             <a:fld id="{239A1177-FC11-4181-8D90-74B5066E7BA4}" type="slidenum">
               <a:rPr lang="zh-TW" altLang="en-US" smtClean="0"/>
+              <a:pPr/>
               <a:t>‹#›</a:t>
             </a:fld>
             <a:endParaRPr lang="zh-TW" altLang="en-US"/>
@@ -1551,7 +1791,8 @@
           <a:p>
             <a:fld id="{0F0447E4-8838-4AEF-B48D-61B1770176D1}" type="datetimeFigureOut">
               <a:rPr lang="zh-TW" altLang="en-US" smtClean="0"/>
-              <a:t>2014/5/4</a:t>
+              <a:pPr/>
+              <a:t>2014/5/5</a:t>
             </a:fld>
             <a:endParaRPr lang="zh-TW" altLang="en-US"/>
           </a:p>
@@ -1593,6 +1834,7 @@
           <a:p>
             <a:fld id="{239A1177-FC11-4181-8D90-74B5066E7BA4}" type="slidenum">
               <a:rPr lang="zh-TW" altLang="en-US" smtClean="0"/>
+              <a:pPr/>
               <a:t>‹#›</a:t>
             </a:fld>
             <a:endParaRPr lang="zh-TW" altLang="en-US"/>
@@ -1716,7 +1958,8 @@
           <a:p>
             <a:fld id="{0F0447E4-8838-4AEF-B48D-61B1770176D1}" type="datetimeFigureOut">
               <a:rPr lang="zh-TW" altLang="en-US" smtClean="0"/>
-              <a:t>2014/5/4</a:t>
+              <a:pPr/>
+              <a:t>2014/5/5</a:t>
             </a:fld>
             <a:endParaRPr lang="zh-TW" altLang="en-US"/>
           </a:p>
@@ -1758,6 +2001,7 @@
           <a:p>
             <a:fld id="{239A1177-FC11-4181-8D90-74B5066E7BA4}" type="slidenum">
               <a:rPr lang="zh-TW" altLang="en-US" smtClean="0"/>
+              <a:pPr/>
               <a:t>‹#›</a:t>
             </a:fld>
             <a:endParaRPr lang="zh-TW" altLang="en-US"/>
@@ -1957,7 +2201,8 @@
           <a:p>
             <a:fld id="{0F0447E4-8838-4AEF-B48D-61B1770176D1}" type="datetimeFigureOut">
               <a:rPr lang="zh-TW" altLang="en-US" smtClean="0"/>
-              <a:t>2014/5/4</a:t>
+              <a:pPr/>
+              <a:t>2014/5/5</a:t>
             </a:fld>
             <a:endParaRPr lang="zh-TW" altLang="en-US"/>
           </a:p>
@@ -1999,6 +2244,7 @@
           <a:p>
             <a:fld id="{239A1177-FC11-4181-8D90-74B5066E7BA4}" type="slidenum">
               <a:rPr lang="zh-TW" altLang="en-US" smtClean="0"/>
+              <a:pPr/>
               <a:t>‹#›</a:t>
             </a:fld>
             <a:endParaRPr lang="zh-TW" altLang="en-US"/>
@@ -2240,7 +2486,8 @@
           <a:p>
             <a:fld id="{0F0447E4-8838-4AEF-B48D-61B1770176D1}" type="datetimeFigureOut">
               <a:rPr lang="zh-TW" altLang="en-US" smtClean="0"/>
-              <a:t>2014/5/4</a:t>
+              <a:pPr/>
+              <a:t>2014/5/5</a:t>
             </a:fld>
             <a:endParaRPr lang="zh-TW" altLang="en-US"/>
           </a:p>
@@ -2282,6 +2529,7 @@
           <a:p>
             <a:fld id="{239A1177-FC11-4181-8D90-74B5066E7BA4}" type="slidenum">
               <a:rPr lang="zh-TW" altLang="en-US" smtClean="0"/>
+              <a:pPr/>
               <a:t>‹#›</a:t>
             </a:fld>
             <a:endParaRPr lang="zh-TW" altLang="en-US"/>
@@ -2657,7 +2905,8 @@
           <a:p>
             <a:fld id="{0F0447E4-8838-4AEF-B48D-61B1770176D1}" type="datetimeFigureOut">
               <a:rPr lang="zh-TW" altLang="en-US" smtClean="0"/>
-              <a:t>2014/5/4</a:t>
+              <a:pPr/>
+              <a:t>2014/5/5</a:t>
             </a:fld>
             <a:endParaRPr lang="zh-TW" altLang="en-US"/>
           </a:p>
@@ -2699,6 +2948,7 @@
           <a:p>
             <a:fld id="{239A1177-FC11-4181-8D90-74B5066E7BA4}" type="slidenum">
               <a:rPr lang="zh-TW" altLang="en-US" smtClean="0"/>
+              <a:pPr/>
               <a:t>‹#›</a:t>
             </a:fld>
             <a:endParaRPr lang="zh-TW" altLang="en-US"/>
@@ -2770,7 +3020,8 @@
           <a:p>
             <a:fld id="{0F0447E4-8838-4AEF-B48D-61B1770176D1}" type="datetimeFigureOut">
               <a:rPr lang="zh-TW" altLang="en-US" smtClean="0"/>
-              <a:t>2014/5/4</a:t>
+              <a:pPr/>
+              <a:t>2014/5/5</a:t>
             </a:fld>
             <a:endParaRPr lang="zh-TW" altLang="en-US"/>
           </a:p>
@@ -2812,6 +3063,7 @@
           <a:p>
             <a:fld id="{239A1177-FC11-4181-8D90-74B5066E7BA4}" type="slidenum">
               <a:rPr lang="zh-TW" altLang="en-US" smtClean="0"/>
+              <a:pPr/>
               <a:t>‹#›</a:t>
             </a:fld>
             <a:endParaRPr lang="zh-TW" altLang="en-US"/>
@@ -2860,7 +3112,8 @@
           <a:p>
             <a:fld id="{0F0447E4-8838-4AEF-B48D-61B1770176D1}" type="datetimeFigureOut">
               <a:rPr lang="zh-TW" altLang="en-US" smtClean="0"/>
-              <a:t>2014/5/4</a:t>
+              <a:pPr/>
+              <a:t>2014/5/5</a:t>
             </a:fld>
             <a:endParaRPr lang="zh-TW" altLang="en-US"/>
           </a:p>
@@ -2902,6 +3155,7 @@
           <a:p>
             <a:fld id="{239A1177-FC11-4181-8D90-74B5066E7BA4}" type="slidenum">
               <a:rPr lang="zh-TW" altLang="en-US" smtClean="0"/>
+              <a:pPr/>
               <a:t>‹#›</a:t>
             </a:fld>
             <a:endParaRPr lang="zh-TW" altLang="en-US"/>
@@ -3132,7 +3386,8 @@
           <a:p>
             <a:fld id="{0F0447E4-8838-4AEF-B48D-61B1770176D1}" type="datetimeFigureOut">
               <a:rPr lang="zh-TW" altLang="en-US" smtClean="0"/>
-              <a:t>2014/5/4</a:t>
+              <a:pPr/>
+              <a:t>2014/5/5</a:t>
             </a:fld>
             <a:endParaRPr lang="zh-TW" altLang="en-US"/>
           </a:p>
@@ -3174,6 +3429,7 @@
           <a:p>
             <a:fld id="{239A1177-FC11-4181-8D90-74B5066E7BA4}" type="slidenum">
               <a:rPr lang="zh-TW" altLang="en-US" smtClean="0"/>
+              <a:pPr/>
               <a:t>‹#›</a:t>
             </a:fld>
             <a:endParaRPr lang="zh-TW" altLang="en-US"/>
@@ -3380,7 +3636,8 @@
           <a:p>
             <a:fld id="{0F0447E4-8838-4AEF-B48D-61B1770176D1}" type="datetimeFigureOut">
               <a:rPr lang="zh-TW" altLang="en-US" smtClean="0"/>
-              <a:t>2014/5/4</a:t>
+              <a:pPr/>
+              <a:t>2014/5/5</a:t>
             </a:fld>
             <a:endParaRPr lang="zh-TW" altLang="en-US"/>
           </a:p>
@@ -3422,6 +3679,7 @@
           <a:p>
             <a:fld id="{239A1177-FC11-4181-8D90-74B5066E7BA4}" type="slidenum">
               <a:rPr lang="zh-TW" altLang="en-US" smtClean="0"/>
+              <a:pPr/>
               <a:t>‹#›</a:t>
             </a:fld>
             <a:endParaRPr lang="zh-TW" altLang="en-US"/>
@@ -3588,7 +3846,8 @@
           <a:p>
             <a:fld id="{0F0447E4-8838-4AEF-B48D-61B1770176D1}" type="datetimeFigureOut">
               <a:rPr lang="zh-TW" altLang="en-US" smtClean="0"/>
-              <a:t>2014/5/4</a:t>
+              <a:pPr/>
+              <a:t>2014/5/5</a:t>
             </a:fld>
             <a:endParaRPr lang="zh-TW" altLang="en-US"/>
           </a:p>
@@ -3666,6 +3925,7 @@
           <a:p>
             <a:fld id="{239A1177-FC11-4181-8D90-74B5066E7BA4}" type="slidenum">
               <a:rPr lang="zh-TW" altLang="en-US" smtClean="0"/>
+              <a:pPr/>
               <a:t>‹#›</a:t>
             </a:fld>
             <a:endParaRPr lang="zh-TW" altLang="en-US"/>
@@ -4009,10 +4269,191 @@
   <p:clrMapOvr>
     <a:masterClrMapping/>
   </p:clrMapOvr>
+  <p:timing>
+    <p:tnLst>
+      <p:par>
+        <p:cTn id="1" dur="indefinite" restart="never" nodeType="tmRoot"/>
+      </p:par>
+    </p:tnLst>
+  </p:timing>
 </p:sld>
 </file>
 
 <file path=ppt/slides/slide2.xml><?xml version="1.0" encoding="utf-8"?>
+<p:sld xmlns:a="http://schemas.openxmlformats.org/drawingml/2006/main" xmlns:r="http://schemas.openxmlformats.org/officeDocument/2006/relationships" xmlns:p="http://schemas.openxmlformats.org/presentationml/2006/main">
+  <p:cSld>
+    <p:spTree>
+      <p:nvGrpSpPr>
+        <p:cNvPr id="1" name=""/>
+        <p:cNvGrpSpPr/>
+        <p:nvPr/>
+      </p:nvGrpSpPr>
+      <p:grpSpPr>
+        <a:xfrm>
+          <a:off x="0" y="0"/>
+          <a:ext cx="0" cy="0"/>
+          <a:chOff x="0" y="0"/>
+          <a:chExt cx="0" cy="0"/>
+        </a:xfrm>
+      </p:grpSpPr>
+      <p:sp>
+        <p:nvSpPr>
+          <p:cNvPr id="2" name="標題 1"/>
+          <p:cNvSpPr>
+            <a:spLocks noGrp="1"/>
+          </p:cNvSpPr>
+          <p:nvPr>
+            <p:ph type="title"/>
+          </p:nvPr>
+        </p:nvSpPr>
+        <p:spPr>
+          <a:xfrm>
+            <a:off x="35496" y="44624"/>
+            <a:ext cx="3528392" cy="1143000"/>
+          </a:xfrm>
+        </p:spPr>
+        <p:txBody>
+          <a:bodyPr>
+            <a:normAutofit/>
+          </a:bodyPr>
+          <a:lstStyle/>
+          <a:p>
+            <a:r>
+              <a:rPr lang="en-US" altLang="zh-TW" sz="3600" dirty="0" smtClean="0"/>
+              <a:t>Code Directly</a:t>
+            </a:r>
+            <a:endParaRPr lang="zh-TW" altLang="en-US" sz="3600" dirty="0"/>
+          </a:p>
+        </p:txBody>
+      </p:sp>
+      <p:pic>
+        <p:nvPicPr>
+          <p:cNvPr id="1026" name="Picture 2"/>
+          <p:cNvPicPr>
+            <a:picLocks noChangeAspect="1" noChangeArrowheads="1"/>
+          </p:cNvPicPr>
+          <p:nvPr/>
+        </p:nvPicPr>
+        <p:blipFill>
+          <a:blip r:embed="rId3" cstate="print"/>
+          <a:srcRect/>
+          <a:stretch>
+            <a:fillRect/>
+          </a:stretch>
+        </p:blipFill>
+        <p:spPr bwMode="auto">
+          <a:xfrm>
+            <a:off x="3131840" y="476672"/>
+            <a:ext cx="4238625" cy="5876925"/>
+          </a:xfrm>
+          <a:prstGeom prst="rect">
+            <a:avLst/>
+          </a:prstGeom>
+          <a:noFill/>
+          <a:ln w="9525">
+            <a:noFill/>
+            <a:miter lim="800000"/>
+            <a:headEnd/>
+            <a:tailEnd/>
+          </a:ln>
+        </p:spPr>
+      </p:pic>
+    </p:spTree>
+    <p:extLst>
+      <p:ext uri="{BB962C8B-B14F-4D97-AF65-F5344CB8AC3E}">
+        <p14:creationId xmlns:p14="http://schemas.microsoft.com/office/powerpoint/2010/main" xmlns="" val="4173134209"/>
+      </p:ext>
+    </p:extLst>
+  </p:cSld>
+  <p:clrMapOvr>
+    <a:masterClrMapping/>
+  </p:clrMapOvr>
+  <p:timing>
+    <p:tnLst>
+      <p:par>
+        <p:cTn id="1" dur="indefinite" restart="never" nodeType="tmRoot"/>
+      </p:par>
+    </p:tnLst>
+  </p:timing>
+</p:sld>
+</file>
+
+<file path=ppt/slides/slide3.xml><?xml version="1.0" encoding="utf-8"?>
+<p:sld xmlns:a="http://schemas.openxmlformats.org/drawingml/2006/main" xmlns:r="http://schemas.openxmlformats.org/officeDocument/2006/relationships" xmlns:p="http://schemas.openxmlformats.org/presentationml/2006/main">
+  <p:cSld>
+    <p:spTree>
+      <p:nvGrpSpPr>
+        <p:cNvPr id="1" name=""/>
+        <p:cNvGrpSpPr/>
+        <p:nvPr/>
+      </p:nvGrpSpPr>
+      <p:grpSpPr>
+        <a:xfrm>
+          <a:off x="0" y="0"/>
+          <a:ext cx="0" cy="0"/>
+          <a:chOff x="0" y="0"/>
+          <a:chExt cx="0" cy="0"/>
+        </a:xfrm>
+      </p:grpSpPr>
+      <p:sp>
+        <p:nvSpPr>
+          <p:cNvPr id="2" name="標題 1"/>
+          <p:cNvSpPr>
+            <a:spLocks noGrp="1"/>
+          </p:cNvSpPr>
+          <p:nvPr>
+            <p:ph type="title"/>
+          </p:nvPr>
+        </p:nvSpPr>
+        <p:spPr>
+          <a:xfrm>
+            <a:off x="395536" y="2348880"/>
+            <a:ext cx="8291264" cy="1143000"/>
+          </a:xfrm>
+        </p:spPr>
+        <p:txBody>
+          <a:bodyPr>
+            <a:normAutofit/>
+          </a:bodyPr>
+          <a:lstStyle/>
+          <a:p>
+            <a:r>
+              <a:rPr lang="en-US" altLang="zh-TW" sz="3600" dirty="0" smtClean="0"/>
+              <a:t>Initial</a:t>
+            </a:r>
+            <a:r>
+              <a:rPr lang="en-US" altLang="zh-TW" sz="3600" dirty="0"/>
+              <a:t> </a:t>
+            </a:r>
+            <a:r>
+              <a:rPr lang="en-US" altLang="zh-TW" sz="3600" dirty="0" smtClean="0"/>
+              <a:t>Design</a:t>
+            </a:r>
+            <a:endParaRPr lang="zh-TW" altLang="en-US" sz="3600" dirty="0"/>
+          </a:p>
+        </p:txBody>
+      </p:sp>
+    </p:spTree>
+    <p:extLst>
+      <p:ext uri="{BB962C8B-B14F-4D97-AF65-F5344CB8AC3E}">
+        <p14:creationId xmlns:p14="http://schemas.microsoft.com/office/powerpoint/2010/main" xmlns="" val="4173134209"/>
+      </p:ext>
+    </p:extLst>
+  </p:cSld>
+  <p:clrMapOvr>
+    <a:masterClrMapping/>
+  </p:clrMapOvr>
+  <p:timing>
+    <p:tnLst>
+      <p:par>
+        <p:cTn id="1" dur="indefinite" restart="never" nodeType="tmRoot"/>
+      </p:par>
+    </p:tnLst>
+  </p:timing>
+</p:sld>
+</file>
+
+<file path=ppt/slides/slide4.xml><?xml version="1.0" encoding="utf-8"?>
 <p:sld xmlns:a="http://schemas.openxmlformats.org/drawingml/2006/main" xmlns:r="http://schemas.openxmlformats.org/officeDocument/2006/relationships" xmlns:p="http://schemas.openxmlformats.org/presentationml/2006/main">
   <p:cSld>
     <p:spTree>
@@ -4096,188 +4537,13 @@
   <p:clrMapOvr>
     <a:masterClrMapping/>
   </p:clrMapOvr>
-</p:sld>
-</file>
-
-<file path=ppt/slides/slide3.xml><?xml version="1.0" encoding="utf-8"?>
-<p:sld xmlns:a="http://schemas.openxmlformats.org/drawingml/2006/main" xmlns:r="http://schemas.openxmlformats.org/officeDocument/2006/relationships" xmlns:p="http://schemas.openxmlformats.org/presentationml/2006/main">
-  <p:cSld>
-    <p:spTree>
-      <p:nvGrpSpPr>
-        <p:cNvPr id="1" name=""/>
-        <p:cNvGrpSpPr/>
-        <p:nvPr/>
-      </p:nvGrpSpPr>
-      <p:grpSpPr>
-        <a:xfrm>
-          <a:off x="0" y="0"/>
-          <a:ext cx="0" cy="0"/>
-          <a:chOff x="0" y="0"/>
-          <a:chExt cx="0" cy="0"/>
-        </a:xfrm>
-      </p:grpSpPr>
-      <p:sp>
-        <p:nvSpPr>
-          <p:cNvPr id="2" name="標題 1"/>
-          <p:cNvSpPr>
-            <a:spLocks noGrp="1"/>
-          </p:cNvSpPr>
-          <p:nvPr>
-            <p:ph type="title"/>
-          </p:nvPr>
-        </p:nvSpPr>
-        <p:spPr>
-          <a:xfrm>
-            <a:off x="539552" y="404664"/>
-            <a:ext cx="8291264" cy="1143000"/>
-          </a:xfrm>
-        </p:spPr>
-        <p:txBody>
-          <a:bodyPr>
-            <a:normAutofit/>
-          </a:bodyPr>
-          <a:lstStyle/>
-          <a:p>
-            <a:r>
-              <a:rPr lang="en-US" altLang="zh-TW" sz="2400" dirty="0" smtClean="0"/>
-              <a:t>These documents include Drawing Document, </a:t>
-            </a:r>
-            <a:r>
-              <a:rPr lang="en-US" altLang="zh-TW" sz="2400" dirty="0" err="1" smtClean="0"/>
-              <a:t>TextDocument</a:t>
-            </a:r>
-            <a:r>
-              <a:rPr lang="en-US" altLang="zh-TW" sz="2400" dirty="0" smtClean="0"/>
-              <a:t>, and so on.</a:t>
-            </a:r>
-            <a:endParaRPr lang="zh-TW" altLang="en-US" sz="2400" dirty="0"/>
-          </a:p>
-        </p:txBody>
-      </p:sp>
-      <p:pic>
-        <p:nvPicPr>
-          <p:cNvPr id="2054" name="Picture 6"/>
-          <p:cNvPicPr>
-            <a:picLocks noChangeAspect="1" noChangeArrowheads="1"/>
-          </p:cNvPicPr>
-          <p:nvPr/>
-        </p:nvPicPr>
-        <p:blipFill>
-          <a:blip r:embed="rId3" cstate="print"/>
-          <a:srcRect/>
-          <a:stretch>
-            <a:fillRect/>
-          </a:stretch>
-        </p:blipFill>
-        <p:spPr bwMode="auto">
-          <a:xfrm>
-            <a:off x="611560" y="1700808"/>
-            <a:ext cx="7781925" cy="3476625"/>
-          </a:xfrm>
-          <a:prstGeom prst="rect">
-            <a:avLst/>
-          </a:prstGeom>
-          <a:noFill/>
-          <a:ln w="9525">
-            <a:noFill/>
-            <a:miter lim="800000"/>
-            <a:headEnd/>
-            <a:tailEnd/>
-          </a:ln>
-        </p:spPr>
-      </p:pic>
-    </p:spTree>
-  </p:cSld>
-  <p:clrMapOvr>
-    <a:masterClrMapping/>
-  </p:clrMapOvr>
-</p:sld>
-</file>
-
-<file path=ppt/slides/slide4.xml><?xml version="1.0" encoding="utf-8"?>
-<p:sld xmlns:a="http://schemas.openxmlformats.org/drawingml/2006/main" xmlns:r="http://schemas.openxmlformats.org/officeDocument/2006/relationships" xmlns:p="http://schemas.openxmlformats.org/presentationml/2006/main">
-  <p:cSld>
-    <p:spTree>
-      <p:nvGrpSpPr>
-        <p:cNvPr id="1" name=""/>
-        <p:cNvGrpSpPr/>
-        <p:nvPr/>
-      </p:nvGrpSpPr>
-      <p:grpSpPr>
-        <a:xfrm>
-          <a:off x="0" y="0"/>
-          <a:ext cx="0" cy="0"/>
-          <a:chOff x="0" y="0"/>
-          <a:chExt cx="0" cy="0"/>
-        </a:xfrm>
-      </p:grpSpPr>
-      <p:sp>
-        <p:nvSpPr>
-          <p:cNvPr id="2" name="標題 1"/>
-          <p:cNvSpPr>
-            <a:spLocks noGrp="1"/>
-          </p:cNvSpPr>
-          <p:nvPr>
-            <p:ph type="title"/>
-          </p:nvPr>
-        </p:nvSpPr>
-        <p:spPr>
-          <a:xfrm>
-            <a:off x="539552" y="404664"/>
-            <a:ext cx="8291264" cy="1143000"/>
-          </a:xfrm>
-        </p:spPr>
-        <p:txBody>
-          <a:bodyPr>
-            <a:normAutofit/>
-          </a:bodyPr>
-          <a:lstStyle/>
-          <a:p>
-            <a:r>
-              <a:rPr lang="en-US" altLang="zh-TW" sz="2400" dirty="0" smtClean="0"/>
-              <a:t>The application is responsible for managing documents and will create them as required</a:t>
-            </a:r>
-            <a:endParaRPr lang="zh-TW" altLang="en-US" sz="2400" dirty="0"/>
-          </a:p>
-        </p:txBody>
-      </p:sp>
-      <p:pic>
-        <p:nvPicPr>
-          <p:cNvPr id="3076" name="Picture 4"/>
-          <p:cNvPicPr>
-            <a:picLocks noChangeAspect="1" noChangeArrowheads="1"/>
-          </p:cNvPicPr>
-          <p:nvPr/>
-        </p:nvPicPr>
-        <p:blipFill>
-          <a:blip r:embed="rId3" cstate="print"/>
-          <a:srcRect/>
-          <a:stretch>
-            <a:fillRect/>
-          </a:stretch>
-        </p:blipFill>
-        <p:spPr bwMode="auto">
-          <a:xfrm>
-            <a:off x="107504" y="1628800"/>
-            <a:ext cx="8867775" cy="4695825"/>
-          </a:xfrm>
-          <a:prstGeom prst="rect">
-            <a:avLst/>
-          </a:prstGeom>
-          <a:noFill/>
-          <a:ln w="9525">
-            <a:noFill/>
-            <a:miter lim="800000"/>
-            <a:headEnd/>
-            <a:tailEnd/>
-          </a:ln>
-        </p:spPr>
-      </p:pic>
-    </p:spTree>
-  </p:cSld>
-  <p:clrMapOvr>
-    <a:masterClrMapping/>
-  </p:clrMapOvr>
+  <p:timing>
+    <p:tnLst>
+      <p:par>
+        <p:cTn id="1" dur="indefinite" restart="never" nodeType="tmRoot"/>
+      </p:par>
+    </p:tnLst>
+  </p:timing>
 </p:sld>
 </file>
 
@@ -4310,7 +4576,7 @@
         </p:nvSpPr>
         <p:spPr>
           <a:xfrm>
-            <a:off x="395536" y="2348880"/>
+            <a:off x="539552" y="404664"/>
             <a:ext cx="8291264" cy="1143000"/>
           </a:xfrm>
         </p:spPr>
@@ -4321,18 +4587,57 @@
           <a:lstStyle/>
           <a:p>
             <a:r>
-              <a:rPr lang="en-US" altLang="zh-TW" sz="3600" dirty="0" smtClean="0"/>
-              <a:t>Re-Design</a:t>
-            </a:r>
-            <a:endParaRPr lang="zh-TW" altLang="en-US" sz="3600" dirty="0"/>
-          </a:p>
-        </p:txBody>
-      </p:sp>
+              <a:rPr lang="en-US" altLang="zh-TW" sz="2400" dirty="0" smtClean="0"/>
+              <a:t>These documents include Drawing Document, </a:t>
+            </a:r>
+            <a:r>
+              <a:rPr lang="en-US" altLang="zh-TW" sz="2400" dirty="0" err="1" smtClean="0"/>
+              <a:t>TextDocument</a:t>
+            </a:r>
+            <a:r>
+              <a:rPr lang="en-US" altLang="zh-TW" sz="2400" dirty="0" smtClean="0"/>
+              <a:t>, and so on.</a:t>
+            </a:r>
+            <a:endParaRPr lang="zh-TW" altLang="en-US" sz="2400" dirty="0"/>
+          </a:p>
+        </p:txBody>
+      </p:sp>
+      <p:pic>
+        <p:nvPicPr>
+          <p:cNvPr id="12" name="圖片 11"/>
+          <p:cNvPicPr>
+            <a:picLocks noChangeAspect="1"/>
+          </p:cNvPicPr>
+          <p:nvPr/>
+        </p:nvPicPr>
+        <p:blipFill>
+          <a:blip r:embed="rId3" cstate="print"/>
+          <a:stretch>
+            <a:fillRect/>
+          </a:stretch>
+        </p:blipFill>
+        <p:spPr>
+          <a:xfrm>
+            <a:off x="813271" y="1628800"/>
+            <a:ext cx="7743825" cy="3781425"/>
+          </a:xfrm>
+          <a:prstGeom prst="rect">
+            <a:avLst/>
+          </a:prstGeom>
+        </p:spPr>
+      </p:pic>
     </p:spTree>
   </p:cSld>
   <p:clrMapOvr>
     <a:masterClrMapping/>
   </p:clrMapOvr>
+  <p:timing>
+    <p:tnLst>
+      <p:par>
+        <p:cTn id="1" dur="indefinite" restart="never" nodeType="tmRoot"/>
+      </p:par>
+    </p:tnLst>
+  </p:timing>
 </p:sld>
 </file>
 
@@ -4353,36 +4658,58 @@
           <a:chExt cx="0" cy="0"/>
         </a:xfrm>
       </p:grpSpPr>
+      <p:sp>
+        <p:nvSpPr>
+          <p:cNvPr id="2" name="標題 1"/>
+          <p:cNvSpPr>
+            <a:spLocks noGrp="1"/>
+          </p:cNvSpPr>
+          <p:nvPr>
+            <p:ph type="title"/>
+          </p:nvPr>
+        </p:nvSpPr>
+        <p:spPr>
+          <a:xfrm>
+            <a:off x="539552" y="404664"/>
+            <a:ext cx="8291264" cy="1143000"/>
+          </a:xfrm>
+        </p:spPr>
+        <p:txBody>
+          <a:bodyPr>
+            <a:normAutofit/>
+          </a:bodyPr>
+          <a:lstStyle/>
+          <a:p>
+            <a:r>
+              <a:rPr lang="en-US" altLang="zh-TW" sz="2400" dirty="0" smtClean="0"/>
+              <a:t>The application is responsible for managing documents and will create them as required</a:t>
+            </a:r>
+            <a:endParaRPr lang="zh-TW" altLang="en-US" sz="2400" dirty="0"/>
+          </a:p>
+        </p:txBody>
+      </p:sp>
       <p:pic>
         <p:nvPicPr>
-          <p:cNvPr id="4099" name="Picture 3"/>
+          <p:cNvPr id="5" name="圖片 4"/>
           <p:cNvPicPr>
-            <a:picLocks noChangeAspect="1" noChangeArrowheads="1"/>
+            <a:picLocks noChangeAspect="1"/>
           </p:cNvPicPr>
           <p:nvPr/>
         </p:nvPicPr>
         <p:blipFill>
           <a:blip r:embed="rId3" cstate="print"/>
-          <a:srcRect/>
           <a:stretch>
             <a:fillRect/>
           </a:stretch>
         </p:blipFill>
-        <p:spPr bwMode="auto">
+        <p:spPr>
           <a:xfrm>
-            <a:off x="395288" y="1357313"/>
-            <a:ext cx="8353425" cy="4143375"/>
+            <a:off x="101545" y="1628800"/>
+            <a:ext cx="9039225" cy="5000625"/>
           </a:xfrm>
           <a:prstGeom prst="rect">
             <a:avLst/>
           </a:prstGeom>
-          <a:noFill/>
-          <a:ln w="9525">
-            <a:noFill/>
-            <a:miter lim="800000"/>
-            <a:headEnd/>
-            <a:tailEnd/>
-          </a:ln>
         </p:spPr>
       </p:pic>
     </p:spTree>
@@ -4390,10 +4717,133 @@
   <p:clrMapOvr>
     <a:masterClrMapping/>
   </p:clrMapOvr>
+  <p:timing>
+    <p:tnLst>
+      <p:par>
+        <p:cTn id="1" dur="indefinite" restart="never" nodeType="tmRoot"/>
+      </p:par>
+    </p:tnLst>
+  </p:timing>
 </p:sld>
 </file>
 
 <file path=ppt/slides/slide7.xml><?xml version="1.0" encoding="utf-8"?>
+<p:sld xmlns:a="http://schemas.openxmlformats.org/drawingml/2006/main" xmlns:r="http://schemas.openxmlformats.org/officeDocument/2006/relationships" xmlns:p="http://schemas.openxmlformats.org/presentationml/2006/main">
+  <p:cSld>
+    <p:spTree>
+      <p:nvGrpSpPr>
+        <p:cNvPr id="1" name=""/>
+        <p:cNvGrpSpPr/>
+        <p:nvPr/>
+      </p:nvGrpSpPr>
+      <p:grpSpPr>
+        <a:xfrm>
+          <a:off x="0" y="0"/>
+          <a:ext cx="0" cy="0"/>
+          <a:chOff x="0" y="0"/>
+          <a:chExt cx="0" cy="0"/>
+        </a:xfrm>
+      </p:grpSpPr>
+      <p:sp>
+        <p:nvSpPr>
+          <p:cNvPr id="2" name="標題 1"/>
+          <p:cNvSpPr>
+            <a:spLocks noGrp="1"/>
+          </p:cNvSpPr>
+          <p:nvPr>
+            <p:ph type="title"/>
+          </p:nvPr>
+        </p:nvSpPr>
+        <p:spPr>
+          <a:xfrm>
+            <a:off x="395536" y="2348880"/>
+            <a:ext cx="8291264" cy="1143000"/>
+          </a:xfrm>
+        </p:spPr>
+        <p:txBody>
+          <a:bodyPr>
+            <a:normAutofit/>
+          </a:bodyPr>
+          <a:lstStyle/>
+          <a:p>
+            <a:r>
+              <a:rPr lang="en-US" altLang="zh-TW" sz="3600" dirty="0" smtClean="0"/>
+              <a:t>Re-Design</a:t>
+            </a:r>
+            <a:endParaRPr lang="zh-TW" altLang="en-US" sz="3600" dirty="0"/>
+          </a:p>
+        </p:txBody>
+      </p:sp>
+    </p:spTree>
+  </p:cSld>
+  <p:clrMapOvr>
+    <a:masterClrMapping/>
+  </p:clrMapOvr>
+  <p:timing>
+    <p:tnLst>
+      <p:par>
+        <p:cTn id="1" dur="indefinite" restart="never" nodeType="tmRoot"/>
+      </p:par>
+    </p:tnLst>
+  </p:timing>
+</p:sld>
+</file>
+
+<file path=ppt/slides/slide8.xml><?xml version="1.0" encoding="utf-8"?>
+<p:sld xmlns:a="http://schemas.openxmlformats.org/drawingml/2006/main" xmlns:r="http://schemas.openxmlformats.org/officeDocument/2006/relationships" xmlns:p="http://schemas.openxmlformats.org/presentationml/2006/main">
+  <p:cSld>
+    <p:spTree>
+      <p:nvGrpSpPr>
+        <p:cNvPr id="1" name=""/>
+        <p:cNvGrpSpPr/>
+        <p:nvPr/>
+      </p:nvGrpSpPr>
+      <p:grpSpPr>
+        <a:xfrm>
+          <a:off x="0" y="0"/>
+          <a:ext cx="0" cy="0"/>
+          <a:chOff x="0" y="0"/>
+          <a:chExt cx="0" cy="0"/>
+        </a:xfrm>
+      </p:grpSpPr>
+      <p:pic>
+        <p:nvPicPr>
+          <p:cNvPr id="4" name="圖片 3"/>
+          <p:cNvPicPr>
+            <a:picLocks noChangeAspect="1"/>
+          </p:cNvPicPr>
+          <p:nvPr/>
+        </p:nvPicPr>
+        <p:blipFill>
+          <a:blip r:embed="rId3" cstate="print"/>
+          <a:stretch>
+            <a:fillRect/>
+          </a:stretch>
+        </p:blipFill>
+        <p:spPr>
+          <a:xfrm>
+            <a:off x="179512" y="1008268"/>
+            <a:ext cx="8636024" cy="5085028"/>
+          </a:xfrm>
+          <a:prstGeom prst="rect">
+            <a:avLst/>
+          </a:prstGeom>
+        </p:spPr>
+      </p:pic>
+    </p:spTree>
+    <p:extLst>
+      <p:ext uri="{BB962C8B-B14F-4D97-AF65-F5344CB8AC3E}">
+        <p14:creationId xmlns:p14="http://schemas.microsoft.com/office/powerpoint/2010/main" xmlns="" val="3812447893"/>
+      </p:ext>
+    </p:extLst>
+  </p:cSld>
+  <p:clrMapOvr>
+    <a:masterClrMapping/>
+  </p:clrMapOvr>
+</p:sld>
+</file>
+
+<file path=ppt/slides/slide9.xml><?xml version="1.0" encoding="utf-8"?>
 <p:sld xmlns:a="http://schemas.openxmlformats.org/drawingml/2006/main" xmlns:r="http://schemas.openxmlformats.org/officeDocument/2006/relationships" xmlns:p="http://schemas.openxmlformats.org/presentationml/2006/main">
   <p:cSld>
     <p:spTree>
@@ -4447,6 +4897,13 @@
   <p:clrMapOvr>
     <a:masterClrMapping/>
   </p:clrMapOvr>
+  <p:timing>
+    <p:tnLst>
+      <p:par>
+        <p:cTn id="1" dur="indefinite" restart="never" nodeType="tmRoot"/>
+      </p:par>
+    </p:tnLst>
+  </p:timing>
 </p:sld>
 </file>
 

</xml_diff>